<commit_message>
moving pdf and pptx to media folder
</commit_message>
<xml_diff>
--- a/Media/Soul Reaper Registry.pptx
+++ b/Media/Soul Reaper Registry.pptx
@@ -6237,19 +6237,7 @@
             </a:r>
             <a:r>
               <a:rPr lang="bg-BG" dirty="0" smtClean="0"/>
-              <a:t>и да може да извиква всеки обект и </a:t>
-            </a:r>
-            <a:r>
-              <a:rPr lang="bg-BG" dirty="0" smtClean="0"/>
-              <a:t>цялата информация </a:t>
-            </a:r>
-            <a:r>
-              <a:rPr lang="bg-BG" dirty="0" smtClean="0"/>
-              <a:t>за него</a:t>
-            </a:r>
-            <a:r>
-              <a:rPr lang="bg-BG" dirty="0" smtClean="0"/>
-              <a:t>.</a:t>
+              <a:t>и да може да извиква всеки обект и цялата информация за него.</a:t>
             </a:r>
           </a:p>
           <a:p>
@@ -6322,11 +6310,7 @@
             </a:r>
             <a:r>
               <a:rPr lang="bg-BG" dirty="0" smtClean="0"/>
-              <a:t>на обект</a:t>
-            </a:r>
-            <a:r>
-              <a:rPr lang="bg-BG" dirty="0" smtClean="0"/>
-              <a:t>(</a:t>
+              <a:t>на обект(</a:t>
             </a:r>
             <a:r>
               <a:rPr lang="en-US" dirty="0" smtClean="0"/>
@@ -7431,6 +7415,39 @@
               <a:t>(RDBMS) DataGrip;</a:t>
             </a:r>
             <a:endParaRPr lang="en-US" sz="2000" dirty="0"/>
+          </a:p>
+        </p:txBody>
+      </p:sp>
+      <p:sp>
+        <p:nvSpPr>
+          <p:cNvPr id="6" name="Rectangle 5"/>
+          <p:cNvSpPr/>
+          <p:nvPr/>
+        </p:nvSpPr>
+        <p:spPr>
+          <a:xfrm>
+            <a:off x="8728362" y="6211670"/>
+            <a:ext cx="3463638" cy="646330"/>
+          </a:xfrm>
+          <a:prstGeom prst="rect">
+            <a:avLst/>
+          </a:prstGeom>
+        </p:spPr>
+        <p:txBody>
+          <a:bodyPr wrap="square">
+            <a:spAutoFit/>
+          </a:bodyPr>
+          <a:lstStyle/>
+          <a:p>
+            <a:r>
+              <a:rPr lang="bg-BG" dirty="0"/>
+              <a:t>За повече информация прочетете </a:t>
+            </a:r>
+            <a:r>
+              <a:rPr lang="bg-BG" dirty="0" smtClean="0"/>
+              <a:t>документацията</a:t>
+            </a:r>
+            <a:endParaRPr lang="bg-BG" dirty="0"/>
           </a:p>
         </p:txBody>
       </p:sp>

</xml_diff>